<commit_message>
minor changes for giannis
</commit_message>
<xml_diff>
--- a/Weekly Meetings/HEP_Weekly_8May2020.pptx
+++ b/Weekly Meetings/HEP_Weekly_8May2020.pptx
@@ -206,7 +206,7 @@
           <a:p>
             <a:fld id="{8CD5EADE-870B-3C4D-92F6-FE927CFCE2A1}" type="datetime1">
               <a:rPr lang="en-US" smtClean="0"/>
-              <a:t>5/7/20</a:t>
+              <a:t>5/19/20</a:t>
             </a:fld>
             <a:endParaRPr lang="en-GB"/>
           </a:p>
@@ -412,7 +412,7 @@
           <a:p>
             <a:fld id="{4A3A8317-869C-EC49-8CB2-3286EE886873}" type="datetime1">
               <a:rPr lang="en-US" smtClean="0"/>
-              <a:t>5/7/20</a:t>
+              <a:t>5/19/20</a:t>
             </a:fld>
             <a:endParaRPr lang="en-GB"/>
           </a:p>
@@ -746,7 +746,7 @@
           <a:p>
             <a:fld id="{B49D5E6A-E658-F947-B519-3BD764463DDB}" type="datetime1">
               <a:rPr lang="en-US" smtClean="0"/>
-              <a:t>5/7/20</a:t>
+              <a:t>5/19/20</a:t>
             </a:fld>
             <a:endParaRPr lang="en-GB"/>
           </a:p>
@@ -1014,7 +1014,7 @@
           <a:p>
             <a:fld id="{3FD6B7D5-59BD-A94A-8259-AFB77C1C6F6C}" type="datetime1">
               <a:rPr lang="en-US" smtClean="0"/>
-              <a:t>5/7/20</a:t>
+              <a:t>5/19/20</a:t>
             </a:fld>
             <a:endParaRPr lang="en-US" dirty="0"/>
           </a:p>
@@ -1221,7 +1221,7 @@
           <a:p>
             <a:fld id="{22747042-83B4-2D44-B16D-692521656AEA}" type="datetime1">
               <a:rPr lang="en-US" smtClean="0"/>
-              <a:t>5/7/20</a:t>
+              <a:t>5/19/20</a:t>
             </a:fld>
             <a:endParaRPr lang="en-US" dirty="0"/>
           </a:p>
@@ -1476,7 +1476,7 @@
           <a:p>
             <a:fld id="{123C6174-D222-ED47-AF35-85B52783FDE1}" type="datetime1">
               <a:rPr lang="en-US" smtClean="0"/>
-              <a:t>5/7/20</a:t>
+              <a:t>5/19/20</a:t>
             </a:fld>
             <a:endParaRPr lang="en-US" dirty="0"/>
           </a:p>
@@ -1667,7 +1667,7 @@
           <a:p>
             <a:fld id="{92BB3830-AA68-4343-953F-F849943EB849}" type="datetime1">
               <a:rPr lang="en-US" smtClean="0"/>
-              <a:t>5/7/20</a:t>
+              <a:t>5/19/20</a:t>
             </a:fld>
             <a:endParaRPr lang="en-GB"/>
           </a:p>
@@ -1841,7 +1841,7 @@
           <a:p>
             <a:fld id="{13F0FE4D-A637-F644-BCB7-BB01E9473082}" type="datetime1">
               <a:rPr lang="en-US" smtClean="0"/>
-              <a:t>5/7/20</a:t>
+              <a:t>5/19/20</a:t>
             </a:fld>
             <a:endParaRPr lang="en-GB"/>
           </a:p>
@@ -2091,7 +2091,7 @@
           <a:p>
             <a:fld id="{7916914C-F633-3B4D-8E7C-AF9878FBCAB2}" type="datetime1">
               <a:rPr lang="en-US" smtClean="0"/>
-              <a:t>5/7/20</a:t>
+              <a:t>5/19/20</a:t>
             </a:fld>
             <a:endParaRPr lang="en-GB"/>
           </a:p>
@@ -2327,7 +2327,7 @@
           <a:p>
             <a:fld id="{1BEE493E-6ECC-2D49-AA37-47715FC69928}" type="datetime1">
               <a:rPr lang="en-US" smtClean="0"/>
-              <a:t>5/7/20</a:t>
+              <a:t>5/19/20</a:t>
             </a:fld>
             <a:endParaRPr lang="en-GB"/>
           </a:p>
@@ -2698,7 +2698,7 @@
           <a:p>
             <a:fld id="{44D2375D-BCDA-CD42-A7D1-F6C0DA2CE615}" type="datetime1">
               <a:rPr lang="en-US" smtClean="0"/>
-              <a:t>5/7/20</a:t>
+              <a:t>5/19/20</a:t>
             </a:fld>
             <a:endParaRPr lang="en-GB"/>
           </a:p>
@@ -2820,7 +2820,7 @@
           <a:p>
             <a:fld id="{DF706FF0-E883-3242-B340-EF59CDD02701}" type="datetime1">
               <a:rPr lang="en-US" smtClean="0"/>
-              <a:t>5/7/20</a:t>
+              <a:t>5/19/20</a:t>
             </a:fld>
             <a:endParaRPr lang="en-GB"/>
           </a:p>
@@ -2919,7 +2919,7 @@
           <a:p>
             <a:fld id="{A72B1547-4678-7444-8B0B-D61236993AA6}" type="datetime1">
               <a:rPr lang="en-US" smtClean="0"/>
-              <a:t>5/7/20</a:t>
+              <a:t>5/19/20</a:t>
             </a:fld>
             <a:endParaRPr lang="en-GB"/>
           </a:p>
@@ -3200,7 +3200,7 @@
           <a:p>
             <a:fld id="{F5C0FF04-D16D-9545-B9FE-2A2509161914}" type="datetime1">
               <a:rPr lang="en-US" smtClean="0"/>
-              <a:t>5/7/20</a:t>
+              <a:t>5/19/20</a:t>
             </a:fld>
             <a:endParaRPr lang="en-GB"/>
           </a:p>
@@ -3356,7 +3356,7 @@
           <a:p>
             <a:fld id="{739BCA09-01A4-7D40-97AF-A677405590ED}" type="datetime1">
               <a:rPr lang="en-US" smtClean="0"/>
-              <a:t>5/7/20</a:t>
+              <a:t>5/19/20</a:t>
             </a:fld>
             <a:endParaRPr lang="en-US" dirty="0"/>
           </a:p>
@@ -3637,7 +3637,7 @@
           <a:p>
             <a:fld id="{95430EDC-66BF-5B4F-9F6B-EF430B2635C2}" type="datetime1">
               <a:rPr lang="en-US" smtClean="0"/>
-              <a:t>5/7/20</a:t>
+              <a:t>5/19/20</a:t>
             </a:fld>
             <a:endParaRPr lang="en-GB"/>
           </a:p>
@@ -3811,7 +3811,7 @@
           <a:p>
             <a:fld id="{C40C6D0C-61E5-A14E-AA64-932059ABBCA0}" type="datetime1">
               <a:rPr lang="en-US" smtClean="0"/>
-              <a:t>5/7/20</a:t>
+              <a:t>5/19/20</a:t>
             </a:fld>
             <a:endParaRPr lang="en-GB"/>
           </a:p>
@@ -3995,7 +3995,7 @@
           <a:p>
             <a:fld id="{686993B2-94FA-8143-ACBD-1339E5A7C63D}" type="datetime1">
               <a:rPr lang="en-US" smtClean="0"/>
-              <a:t>5/7/20</a:t>
+              <a:t>5/19/20</a:t>
             </a:fld>
             <a:endParaRPr lang="en-GB"/>
           </a:p>
@@ -4342,7 +4342,7 @@
           <a:p>
             <a:fld id="{887F3A82-5004-DE46-9B8F-C8D1AE47BCDD}" type="datetime1">
               <a:rPr lang="en-US" smtClean="0"/>
-              <a:t>5/7/20</a:t>
+              <a:t>5/19/20</a:t>
             </a:fld>
             <a:endParaRPr lang="en-US" dirty="0"/>
           </a:p>
@@ -4616,7 +4616,7 @@
           <a:p>
             <a:fld id="{9609816B-101F-E649-A6DB-1B34F62305FD}" type="datetime1">
               <a:rPr lang="en-US" smtClean="0"/>
-              <a:t>5/7/20</a:t>
+              <a:t>5/19/20</a:t>
             </a:fld>
             <a:endParaRPr lang="en-US" dirty="0"/>
           </a:p>
@@ -4994,7 +4994,7 @@
           <a:p>
             <a:fld id="{B4B9C9C3-E10A-4046-99D1-D14A01669CB5}" type="datetime1">
               <a:rPr lang="en-US" smtClean="0"/>
-              <a:t>5/7/20</a:t>
+              <a:t>5/19/20</a:t>
             </a:fld>
             <a:endParaRPr lang="en-US" dirty="0"/>
           </a:p>
@@ -5111,7 +5111,7 @@
           <a:p>
             <a:fld id="{B20DF165-EA06-4348-9825-CC0EB7B994A5}" type="datetime1">
               <a:rPr lang="en-US" smtClean="0"/>
-              <a:t>5/7/20</a:t>
+              <a:t>5/19/20</a:t>
             </a:fld>
             <a:endParaRPr lang="en-US" dirty="0"/>
           </a:p>
@@ -5281,7 +5281,7 @@
           <a:p>
             <a:fld id="{BC939BB5-C2A2-354E-94F1-11C8ABC84871}" type="datetime1">
               <a:rPr lang="en-US" smtClean="0"/>
-              <a:t>5/7/20</a:t>
+              <a:t>5/19/20</a:t>
             </a:fld>
             <a:endParaRPr lang="en-US" dirty="0"/>
           </a:p>
@@ -5665,7 +5665,7 @@
           <a:p>
             <a:fld id="{6BC13A68-213D-F04B-9D09-F80EB8CDDAAA}" type="datetime1">
               <a:rPr lang="en-US" smtClean="0"/>
-              <a:t>5/7/20</a:t>
+              <a:t>5/19/20</a:t>
             </a:fld>
             <a:endParaRPr lang="en-US" dirty="0"/>
           </a:p>
@@ -6047,7 +6047,7 @@
           <a:p>
             <a:fld id="{3C9CB665-2448-6244-98A5-6DB781AF1920}" type="datetime1">
               <a:rPr lang="en-US" smtClean="0"/>
-              <a:t>5/7/20</a:t>
+              <a:t>5/19/20</a:t>
             </a:fld>
             <a:endParaRPr lang="en-US" dirty="0"/>
           </a:p>
@@ -6333,7 +6333,7 @@
           <a:p>
             <a:fld id="{0675E229-76FC-AB46-B5B7-99D6369AD45B}" type="datetime1">
               <a:rPr lang="en-US" smtClean="0"/>
-              <a:t>5/7/20</a:t>
+              <a:t>5/19/20</a:t>
             </a:fld>
             <a:endParaRPr lang="en-US" dirty="0"/>
           </a:p>
@@ -7023,7 +7023,7 @@
           <a:p>
             <a:fld id="{69C84D11-6659-6A4A-919D-F211F249C3CD}" type="datetime1">
               <a:rPr lang="en-US" smtClean="0"/>
-              <a:t>5/7/20</a:t>
+              <a:t>5/19/20</a:t>
             </a:fld>
             <a:endParaRPr lang="en-GB"/>
           </a:p>
@@ -7864,7 +7864,7 @@
           <a:p>
             <a:fld id="{A495A033-A54B-4F41-92C4-F7053274BB0C}" type="datetime1">
               <a:rPr lang="en-US" smtClean="0"/>
-              <a:t>5/7/20</a:t>
+              <a:t>5/19/20</a:t>
             </a:fld>
             <a:endParaRPr lang="en-US" dirty="0"/>
           </a:p>
@@ -8025,42 +8025,12 @@
           <a:p>
             <a:fld id="{A495A033-A54B-4F41-92C4-F7053274BB0C}" type="datetime1">
               <a:rPr lang="en-US" smtClean="0"/>
-              <a:t>5/7/20</a:t>
+              <a:t>5/19/20</a:t>
             </a:fld>
             <a:endParaRPr lang="en-US" dirty="0"/>
           </a:p>
         </p:txBody>
       </p:sp>
-      <p:pic>
-        <p:nvPicPr>
-          <p:cNvPr id="4" name="Picture 3" descr="A close up of a map&#10;&#10;Description automatically generated">
-            <a:extLst>
-              <a:ext uri="{FF2B5EF4-FFF2-40B4-BE49-F238E27FC236}">
-                <a16:creationId xmlns:a16="http://schemas.microsoft.com/office/drawing/2014/main" id="{6DF0C97D-9B04-264C-9DF9-9915DDF1AE8B}"/>
-              </a:ext>
-            </a:extLst>
-          </p:cNvPr>
-          <p:cNvPicPr>
-            <a:picLocks noChangeAspect="1"/>
-          </p:cNvPicPr>
-          <p:nvPr/>
-        </p:nvPicPr>
-        <p:blipFill>
-          <a:blip r:embed="rId2"/>
-          <a:stretch>
-            <a:fillRect/>
-          </a:stretch>
-        </p:blipFill>
-        <p:spPr>
-          <a:xfrm>
-            <a:off x="486861" y="1369144"/>
-            <a:ext cx="4936490" cy="3665220"/>
-          </a:xfrm>
-          <a:prstGeom prst="rect">
-            <a:avLst/>
-          </a:prstGeom>
-        </p:spPr>
-      </p:pic>
       <p:sp>
         <p:nvSpPr>
           <p:cNvPr id="8" name="TextBox 7">
@@ -8101,36 +8071,6 @@
           </a:p>
         </p:txBody>
       </p:sp>
-      <p:pic>
-        <p:nvPicPr>
-          <p:cNvPr id="12" name="Picture 11" descr="A close up of a map&#10;&#10;Description automatically generated">
-            <a:extLst>
-              <a:ext uri="{FF2B5EF4-FFF2-40B4-BE49-F238E27FC236}">
-                <a16:creationId xmlns:a16="http://schemas.microsoft.com/office/drawing/2014/main" id="{286D65AB-C0F2-B849-97AB-83BD8B614246}"/>
-              </a:ext>
-            </a:extLst>
-          </p:cNvPr>
-          <p:cNvPicPr>
-            <a:picLocks noChangeAspect="1"/>
-          </p:cNvPicPr>
-          <p:nvPr/>
-        </p:nvPicPr>
-        <p:blipFill>
-          <a:blip r:embed="rId3"/>
-          <a:stretch>
-            <a:fillRect/>
-          </a:stretch>
-        </p:blipFill>
-        <p:spPr>
-          <a:xfrm>
-            <a:off x="6768649" y="1362645"/>
-            <a:ext cx="4936490" cy="3632200"/>
-          </a:xfrm>
-          <a:prstGeom prst="rect">
-            <a:avLst/>
-          </a:prstGeom>
-        </p:spPr>
-      </p:pic>
       <p:sp>
         <p:nvSpPr>
           <p:cNvPr id="14" name="TextBox 13">
@@ -8168,50 +8108,6 @@
               <a:rPr lang="en-GR" dirty="0"/>
               <a:t>ithout mass cut</a:t>
             </a:r>
-          </a:p>
-        </p:txBody>
-      </p:sp>
-      <p:sp>
-        <p:nvSpPr>
-          <p:cNvPr id="13" name="TextBox 12">
-            <a:extLst>
-              <a:ext uri="{FF2B5EF4-FFF2-40B4-BE49-F238E27FC236}">
-                <a16:creationId xmlns:a16="http://schemas.microsoft.com/office/drawing/2014/main" id="{BFECE758-F71F-934C-87C1-0CFCE4CC1BEC}"/>
-              </a:ext>
-            </a:extLst>
-          </p:cNvPr>
-          <p:cNvSpPr txBox="1"/>
-          <p:nvPr/>
-        </p:nvSpPr>
-        <p:spPr>
-          <a:xfrm>
-            <a:off x="486861" y="5174173"/>
-            <a:ext cx="5447899" cy="923330"/>
-          </a:xfrm>
-          <a:prstGeom prst="rect">
-            <a:avLst/>
-          </a:prstGeom>
-          <a:noFill/>
-        </p:spPr>
-        <p:txBody>
-          <a:bodyPr wrap="square" rtlCol="0">
-            <a:spAutoFit/>
-          </a:bodyPr>
-          <a:lstStyle/>
-          <a:p>
-            <a:r>
-              <a:rPr lang="en-US" dirty="0">
-                <a:solidFill>
-                  <a:srgbClr val="FF0000"/>
-                </a:solidFill>
-              </a:rPr>
-              <a:t>Waiting for production so that we can check whether the ttbar contamination in the CR is maybe a consequence of our training…</a:t>
-            </a:r>
-            <a:endParaRPr lang="en-GR" dirty="0">
-              <a:solidFill>
-                <a:srgbClr val="FF0000"/>
-              </a:solidFill>
-            </a:endParaRPr>
           </a:p>
         </p:txBody>
       </p:sp>

</xml_diff>